<commit_message>
Added first online video for Unit 6
</commit_message>
<xml_diff>
--- a/lectures/Lect05_Lasso.pptx
+++ b/lectures/Lect05_Lasso.pptx
@@ -10,7 +10,7 @@
   <p:sldIdLst>
     <p:sldId id="258" r:id="rId2"/>
     <p:sldId id="275" r:id="rId3"/>
-    <p:sldId id="437" r:id="rId4"/>
+    <p:sldId id="452" r:id="rId4"/>
     <p:sldId id="419" r:id="rId5"/>
     <p:sldId id="420" r:id="rId6"/>
     <p:sldId id="421" r:id="rId7"/>
@@ -24,7 +24,7 @@
     <p:sldId id="428" r:id="rId15"/>
     <p:sldId id="429" r:id="rId16"/>
     <p:sldId id="431" r:id="rId17"/>
-    <p:sldId id="432" r:id="rId18"/>
+    <p:sldId id="451" r:id="rId18"/>
     <p:sldId id="364" r:id="rId19"/>
     <p:sldId id="363" r:id="rId20"/>
     <p:sldId id="365" r:id="rId21"/>
@@ -891,7 +891,7 @@
     </p:spTree>
     <p:extLst>
       <p:ext uri="{BB962C8B-B14F-4D97-AF65-F5344CB8AC3E}">
-        <p14:creationId xmlns:p14="http://schemas.microsoft.com/office/powerpoint/2010/main" val="4025541435"/>
+        <p14:creationId xmlns:p14="http://schemas.microsoft.com/office/powerpoint/2010/main" val="949080768"/>
       </p:ext>
     </p:extLst>
   </p:cSld>
@@ -975,7 +975,7 @@
     </p:spTree>
     <p:extLst>
       <p:ext uri="{BB962C8B-B14F-4D97-AF65-F5344CB8AC3E}">
-        <p14:creationId xmlns:p14="http://schemas.microsoft.com/office/powerpoint/2010/main" val="4048747988"/>
+        <p14:creationId xmlns:p14="http://schemas.microsoft.com/office/powerpoint/2010/main" val="3674747539"/>
       </p:ext>
     </p:extLst>
   </p:cSld>
@@ -7444,7 +7444,7 @@
           <a:p>
             <a:r>
               <a:rPr lang="en-US" dirty="0"/>
-              <a:t>Housing prices prediction in python</a:t>
+              <a:t>Housing prices prediction with LASSO</a:t>
             </a:r>
           </a:p>
           <a:p>
@@ -7504,7 +7504,7 @@
         </p:nvSpPr>
         <p:spPr>
           <a:xfrm>
-            <a:off x="314049" y="1914587"/>
+            <a:off x="304718" y="1895926"/>
             <a:ext cx="978408" cy="484632"/>
           </a:xfrm>
           <a:prstGeom prst="rightArrow">
@@ -7545,7 +7545,7 @@
     </p:spTree>
     <p:extLst>
       <p:ext uri="{BB962C8B-B14F-4D97-AF65-F5344CB8AC3E}">
-        <p14:creationId xmlns:p14="http://schemas.microsoft.com/office/powerpoint/2010/main" val="3788547181"/>
+        <p14:creationId xmlns:p14="http://schemas.microsoft.com/office/powerpoint/2010/main" val="2281500447"/>
       </p:ext>
     </p:extLst>
   </p:cSld>
@@ -8079,35 +8079,6 @@
           </a:p>
         </p:txBody>
       </p:sp>
-      <p:pic>
-        <p:nvPicPr>
-          <p:cNvPr id="7" name="Picture 6">
-            <a:extLst>
-              <a:ext uri="{FF2B5EF4-FFF2-40B4-BE49-F238E27FC236}">
-                <a16:creationId xmlns:a16="http://schemas.microsoft.com/office/drawing/2014/main" id="{A708641F-0817-4B1B-9EC4-9E86647F53BB}"/>
-              </a:ext>
-            </a:extLst>
-          </p:cNvPr>
-          <p:cNvPicPr>
-            <a:picLocks noChangeAspect="1"/>
-          </p:cNvPicPr>
-          <p:nvPr/>
-        </p:nvPicPr>
-        <p:blipFill rotWithShape="1">
-          <a:blip r:embed="rId3"/>
-          <a:srcRect l="-1" t="21256" r="527" b="12792"/>
-          <a:stretch/>
-        </p:blipFill>
-        <p:spPr>
-          <a:xfrm>
-            <a:off x="2213560" y="1528140"/>
-            <a:ext cx="6728560" cy="1175657"/>
-          </a:xfrm>
-          <a:prstGeom prst="rect">
-            <a:avLst/>
-          </a:prstGeom>
-        </p:spPr>
-      </p:pic>
       <p:sp>
         <p:nvSpPr>
           <p:cNvPr id="8" name="TextBox 7">
@@ -8143,6 +8114,36 @@
           </a:p>
         </p:txBody>
       </p:sp>
+      <p:pic>
+        <p:nvPicPr>
+          <p:cNvPr id="6" name="Picture 5">
+            <a:extLst>
+              <a:ext uri="{FF2B5EF4-FFF2-40B4-BE49-F238E27FC236}">
+                <a16:creationId xmlns:a16="http://schemas.microsoft.com/office/drawing/2014/main" id="{8CC3010A-1209-4B23-90B8-378834DF7471}"/>
+              </a:ext>
+            </a:extLst>
+          </p:cNvPr>
+          <p:cNvPicPr>
+            <a:picLocks noChangeAspect="1"/>
+          </p:cNvPicPr>
+          <p:nvPr/>
+        </p:nvPicPr>
+        <p:blipFill>
+          <a:blip r:embed="rId3"/>
+          <a:stretch>
+            <a:fillRect/>
+          </a:stretch>
+        </p:blipFill>
+        <p:spPr>
+          <a:xfrm>
+            <a:off x="1097280" y="1460932"/>
+            <a:ext cx="7720150" cy="1402871"/>
+          </a:xfrm>
+          <a:prstGeom prst="rect">
+            <a:avLst/>
+          </a:prstGeom>
+        </p:spPr>
+      </p:pic>
     </p:spTree>
     <p:extLst>
       <p:ext uri="{BB962C8B-B14F-4D97-AF65-F5344CB8AC3E}">
@@ -9748,7 +9749,18 @@
           <a:p>
             <a:r>
               <a:rPr lang="en-US" dirty="0"/>
-              <a:t>Mathematically describe linear regression with regularization</a:t>
+              <a:t>Mathematically describe linear regression with </a:t>
+            </a:r>
+            <a:r>
+              <a:rPr lang="en-US" dirty="0">
+                <a:solidFill>
+                  <a:schemeClr val="accent1">
+                    <a:lumMod val="60000"/>
+                    <a:lumOff val="40000"/>
+                  </a:schemeClr>
+                </a:solidFill>
+              </a:rPr>
+              <a:t>regularization</a:t>
             </a:r>
           </a:p>
           <a:p>
@@ -9762,7 +9774,7 @@
             </a:r>
             <a:r>
               <a:rPr lang="en-US" dirty="0"/>
-              <a:t> to impose constraints</a:t>
+              <a:t> to impose constraints such as sparsity</a:t>
             </a:r>
           </a:p>
           <a:p>
@@ -18229,7 +18241,7 @@
           <a:p>
             <a:r>
               <a:rPr lang="en-US" dirty="0"/>
-              <a:t>Housing prices prediction in python</a:t>
+              <a:t>Housing prices prediction with LASSO</a:t>
             </a:r>
           </a:p>
           <a:p>
@@ -18289,7 +18301,7 @@
         </p:nvSpPr>
         <p:spPr>
           <a:xfrm>
-            <a:off x="332710" y="1448057"/>
+            <a:off x="351371" y="1448056"/>
             <a:ext cx="978408" cy="484632"/>
           </a:xfrm>
           <a:prstGeom prst="rightArrow">
@@ -18330,7 +18342,7 @@
     </p:spTree>
     <p:extLst>
       <p:ext uri="{BB962C8B-B14F-4D97-AF65-F5344CB8AC3E}">
-        <p14:creationId xmlns:p14="http://schemas.microsoft.com/office/powerpoint/2010/main" val="1031420377"/>
+        <p14:creationId xmlns:p14="http://schemas.microsoft.com/office/powerpoint/2010/main" val="3827798134"/>
       </p:ext>
     </p:extLst>
   </p:cSld>

</xml_diff>